<commit_message>
added blank slide for farewell speech in L12.1
</commit_message>
<xml_diff>
--- a/Slides/Lesson 12.1 The Last Lecture.pptx
+++ b/Slides/Lesson 12.1 The Last Lecture.pptx
@@ -5,7 +5,7 @@
     <p:sldMasterId id="2147483660" r:id="rId1"/>
   </p:sldMasterIdLst>
   <p:notesMasterIdLst>
-    <p:notesMasterId r:id="rId27"/>
+    <p:notesMasterId r:id="rId28"/>
   </p:notesMasterIdLst>
   <p:sldIdLst>
     <p:sldId id="256" r:id="rId2"/>
@@ -32,7 +32,8 @@
     <p:sldId id="268" r:id="rId23"/>
     <p:sldId id="269" r:id="rId24"/>
     <p:sldId id="270" r:id="rId25"/>
-    <p:sldId id="271" r:id="rId26"/>
+    <p:sldId id="331" r:id="rId26"/>
+    <p:sldId id="271" r:id="rId27"/>
   </p:sldIdLst>
   <p:sldSz cx="9144000" cy="6858000" type="screen4x3"/>
   <p:notesSz cx="7315200" cy="9601200"/>
@@ -251,7 +252,7 @@
             <a:fld id="{3AEE8EC1-C4AE-4A57-9A8B-A8BF77FA5568}" type="datetimeFigureOut">
               <a:rPr lang="en-US" smtClean="0"/>
               <a:pPr/>
-              <a:t>12/2/2017</a:t>
+              <a:t>12/4/2017</a:t>
             </a:fld>
             <a:endParaRPr lang="en-US"/>
           </a:p>
@@ -1448,7 +1449,7 @@
             <a:fld id="{35B728A6-6F57-4E84-A2C2-C78EE294E18B}" type="slidenum">
               <a:rPr lang="en-US" smtClean="0"/>
               <a:pPr/>
-              <a:t>25</a:t>
+              <a:t>26</a:t>
             </a:fld>
             <a:endParaRPr lang="en-US"/>
           </a:p>
@@ -2323,7 +2324,7 @@
           <a:p>
             <a:fld id="{2F1F79F5-7BEC-496A-AFC7-876E38F64D71}" type="datetime1">
               <a:rPr lang="en-US" smtClean="0"/>
-              <a:t>12/2/2017</a:t>
+              <a:t>12/4/2017</a:t>
             </a:fld>
             <a:endParaRPr lang="en-US"/>
           </a:p>
@@ -2440,7 +2441,7 @@
           <a:p>
             <a:fld id="{2F7B77F5-1464-4F6B-92A8-64FC8A508293}" type="datetime1">
               <a:rPr lang="en-US" smtClean="0"/>
-              <a:t>12/2/2017</a:t>
+              <a:t>12/4/2017</a:t>
             </a:fld>
             <a:endParaRPr lang="en-US"/>
           </a:p>
@@ -2535,7 +2536,7 @@
           <a:p>
             <a:fld id="{0A05703A-7669-4FEA-9056-25299B4D29D4}" type="datetime1">
               <a:rPr lang="en-US" smtClean="0"/>
-              <a:t>12/2/2017</a:t>
+              <a:t>12/4/2017</a:t>
             </a:fld>
             <a:endParaRPr lang="en-US"/>
           </a:p>
@@ -2810,7 +2811,7 @@
           <a:p>
             <a:fld id="{6E5077B5-BB57-49DB-88CA-226A139E5C01}" type="datetime1">
               <a:rPr lang="en-US" smtClean="0"/>
-              <a:t>12/2/2017</a:t>
+              <a:t>12/4/2017</a:t>
             </a:fld>
             <a:endParaRPr lang="en-US"/>
           </a:p>
@@ -3062,7 +3063,7 @@
           <a:p>
             <a:fld id="{C48D9447-CBD6-49A1-89FD-8512A8CF8999}" type="datetime1">
               <a:rPr lang="en-US" smtClean="0"/>
-              <a:t>12/2/2017</a:t>
+              <a:t>12/4/2017</a:t>
             </a:fld>
             <a:endParaRPr lang="en-US"/>
           </a:p>
@@ -3230,7 +3231,7 @@
           <a:p>
             <a:fld id="{A3639A2A-823D-48B7-9ACE-7FAF42870BA9}" type="datetime1">
               <a:rPr lang="en-US" smtClean="0"/>
-              <a:t>12/2/2017</a:t>
+              <a:t>12/4/2017</a:t>
             </a:fld>
             <a:endParaRPr lang="en-US"/>
           </a:p>
@@ -3408,7 +3409,7 @@
           <a:p>
             <a:fld id="{ED1B6996-82E9-463C-972C-7B56056E426C}" type="datetime1">
               <a:rPr lang="en-US" smtClean="0"/>
-              <a:t>12/2/2017</a:t>
+              <a:t>12/4/2017</a:t>
             </a:fld>
             <a:endParaRPr lang="en-US"/>
           </a:p>
@@ -3582,7 +3583,7 @@
           <a:p>
             <a:fld id="{E22ED4DA-448D-4BB1-B935-CC112220207B}" type="datetime1">
               <a:rPr lang="en-US" smtClean="0"/>
-              <a:t>12/2/2017</a:t>
+              <a:t>12/4/2017</a:t>
             </a:fld>
             <a:endParaRPr lang="en-US"/>
           </a:p>
@@ -3755,7 +3756,7 @@
           <a:p>
             <a:fld id="{E22ED4DA-448D-4BB1-B935-CC112220207B}" type="datetime1">
               <a:rPr lang="en-US" smtClean="0"/>
-              <a:t>12/2/2017</a:t>
+              <a:t>12/4/2017</a:t>
             </a:fld>
             <a:endParaRPr lang="en-US"/>
           </a:p>
@@ -4018,7 +4019,7 @@
           <a:p>
             <a:fld id="{FF5D65A6-AB94-4435-B0B7-3743215FA46C}" type="datetime1">
               <a:rPr lang="en-US" smtClean="0"/>
-              <a:t>12/2/2017</a:t>
+              <a:t>12/4/2017</a:t>
             </a:fld>
             <a:endParaRPr lang="en-US"/>
           </a:p>
@@ -4194,7 +4195,7 @@
           <a:p>
             <a:fld id="{FF5D65A6-AB94-4435-B0B7-3743215FA46C}" type="datetime1">
               <a:rPr lang="en-US" smtClean="0"/>
-              <a:t>12/2/2017</a:t>
+              <a:t>12/4/2017</a:t>
             </a:fld>
             <a:endParaRPr lang="en-US"/>
           </a:p>
@@ -4488,7 +4489,7 @@
           <a:p>
             <a:fld id="{7C193DC4-6EF0-48C9-B29C-616106A645E1}" type="datetime1">
               <a:rPr lang="en-US" smtClean="0"/>
-              <a:t>12/2/2017</a:t>
+              <a:t>12/4/2017</a:t>
             </a:fld>
             <a:endParaRPr lang="en-US"/>
           </a:p>
@@ -4773,7 +4774,7 @@
           <a:p>
             <a:fld id="{5D1846AD-9252-4647-9435-4C2AC365653A}" type="datetime1">
               <a:rPr lang="en-US" smtClean="0"/>
-              <a:t>12/2/2017</a:t>
+              <a:t>12/4/2017</a:t>
             </a:fld>
             <a:endParaRPr lang="en-US"/>
           </a:p>
@@ -5072,7 +5073,7 @@
           <a:p>
             <a:fld id="{5D1846AD-9252-4647-9435-4C2AC365653A}" type="datetime1">
               <a:rPr lang="en-US" smtClean="0"/>
-              <a:t>12/2/2017</a:t>
+              <a:t>12/4/2017</a:t>
             </a:fld>
             <a:endParaRPr lang="en-US"/>
           </a:p>
@@ -5491,7 +5492,7 @@
           <a:p>
             <a:fld id="{CE56DC10-3561-4063-A6AF-C1CC7A41040A}" type="datetime1">
               <a:rPr lang="en-US" smtClean="0"/>
-              <a:t>12/2/2017</a:t>
+              <a:t>12/4/2017</a:t>
             </a:fld>
             <a:endParaRPr lang="en-US"/>
           </a:p>
@@ -5714,7 +5715,7 @@
           <a:p>
             <a:fld id="{02B3F677-983B-48DB-ADFD-63FE6CBC7FB2}" type="datetime1">
               <a:rPr lang="en-US" smtClean="0"/>
-              <a:t>12/2/2017</a:t>
+              <a:t>12/4/2017</a:t>
             </a:fld>
             <a:endParaRPr lang="en-US"/>
           </a:p>
@@ -10485,6 +10486,65 @@
       </p:grpSpPr>
       <p:sp>
         <p:nvSpPr>
+          <p:cNvPr id="2" name="Slide Number Placeholder 1">
+            <a:extLst>
+              <a:ext uri="{FF2B5EF4-FFF2-40B4-BE49-F238E27FC236}">
+                <a16:creationId xmlns:a16="http://schemas.microsoft.com/office/drawing/2014/main" id="{FA849BD1-DEC1-4C67-BAC8-2D5AF89248CB}"/>
+              </a:ext>
+            </a:extLst>
+          </p:cNvPr>
+          <p:cNvSpPr>
+            <a:spLocks noGrp="1"/>
+          </p:cNvSpPr>
+          <p:nvPr>
+            <p:ph type="sldNum" sz="quarter" idx="12"/>
+          </p:nvPr>
+        </p:nvSpPr>
+        <p:spPr/>
+        <p:txBody>
+          <a:bodyPr/>
+          <a:lstStyle/>
+          <a:p>
+            <a:fld id="{2AF3B5EA-18B6-4040-9F78-6052AF49C681}" type="slidenum">
+              <a:rPr lang="en-US" smtClean="0"/>
+              <a:t>25</a:t>
+            </a:fld>
+            <a:endParaRPr lang="en-US"/>
+          </a:p>
+        </p:txBody>
+      </p:sp>
+    </p:spTree>
+    <p:extLst>
+      <p:ext uri="{BB962C8B-B14F-4D97-AF65-F5344CB8AC3E}">
+        <p14:creationId xmlns:p14="http://schemas.microsoft.com/office/powerpoint/2010/main" val="4072466075"/>
+      </p:ext>
+    </p:extLst>
+  </p:cSld>
+  <p:clrMapOvr>
+    <a:masterClrMapping/>
+  </p:clrMapOvr>
+</p:sld>
+</file>
+
+<file path=ppt/slides/slide26.xml><?xml version="1.0" encoding="utf-8"?>
+<p:sld xmlns:a="http://schemas.openxmlformats.org/drawingml/2006/main" xmlns:r="http://schemas.openxmlformats.org/officeDocument/2006/relationships" xmlns:p="http://schemas.openxmlformats.org/presentationml/2006/main">
+  <p:cSld>
+    <p:spTree>
+      <p:nvGrpSpPr>
+        <p:cNvPr id="1" name=""/>
+        <p:cNvGrpSpPr/>
+        <p:nvPr/>
+      </p:nvGrpSpPr>
+      <p:grpSpPr>
+        <a:xfrm>
+          <a:off x="0" y="0"/>
+          <a:ext cx="0" cy="0"/>
+          <a:chOff x="0" y="0"/>
+          <a:chExt cx="0" cy="0"/>
+        </a:xfrm>
+      </p:grpSpPr>
+      <p:sp>
+        <p:nvSpPr>
           <p:cNvPr id="2" name="Title 1"/>
           <p:cNvSpPr>
             <a:spLocks noGrp="1"/>
@@ -10580,7 +10640,7 @@
             <a:fld id="{B6F15528-21DE-4FAA-801E-634DDDAF4B2B}" type="slidenum">
               <a:rPr lang="en-US" smtClean="0"/>
               <a:pPr/>
-              <a:t>25</a:t>
+              <a:t>26</a:t>
             </a:fld>
             <a:endParaRPr lang="en-US"/>
           </a:p>

</xml_diff>